<commit_message>
i maek fix anglish
spelling error fix
</commit_message>
<xml_diff>
--- a/Agile Tech.pptx
+++ b/Agile Tech.pptx
@@ -297,7 +297,7 @@
           <a:p>
             <a:fld id="{4E9D87FA-FB2D-4EA8-9A59-BBCFF0097196}" type="datetimeFigureOut">
               <a:rPr lang="en-US" smtClean="0"/>
-              <a:t>10/3/2014</a:t>
+              <a:t>14-10-03</a:t>
             </a:fld>
             <a:endParaRPr lang="en-US"/>
           </a:p>
@@ -467,7 +467,7 @@
           <a:p>
             <a:fld id="{4E9D87FA-FB2D-4EA8-9A59-BBCFF0097196}" type="datetimeFigureOut">
               <a:rPr lang="en-US" smtClean="0"/>
-              <a:t>10/3/2014</a:t>
+              <a:t>14-10-03</a:t>
             </a:fld>
             <a:endParaRPr lang="en-US"/>
           </a:p>
@@ -647,7 +647,7 @@
           <a:p>
             <a:fld id="{4E9D87FA-FB2D-4EA8-9A59-BBCFF0097196}" type="datetimeFigureOut">
               <a:rPr lang="en-US" smtClean="0"/>
-              <a:t>10/3/2014</a:t>
+              <a:t>14-10-03</a:t>
             </a:fld>
             <a:endParaRPr lang="en-US"/>
           </a:p>
@@ -817,7 +817,7 @@
           <a:p>
             <a:fld id="{4E9D87FA-FB2D-4EA8-9A59-BBCFF0097196}" type="datetimeFigureOut">
               <a:rPr lang="en-US" smtClean="0"/>
-              <a:t>10/3/2014</a:t>
+              <a:t>14-10-03</a:t>
             </a:fld>
             <a:endParaRPr lang="en-US"/>
           </a:p>
@@ -1063,7 +1063,7 @@
           <a:p>
             <a:fld id="{4E9D87FA-FB2D-4EA8-9A59-BBCFF0097196}" type="datetimeFigureOut">
               <a:rPr lang="en-US" smtClean="0"/>
-              <a:t>10/3/2014</a:t>
+              <a:t>14-10-03</a:t>
             </a:fld>
             <a:endParaRPr lang="en-US"/>
           </a:p>
@@ -1351,7 +1351,7 @@
           <a:p>
             <a:fld id="{4E9D87FA-FB2D-4EA8-9A59-BBCFF0097196}" type="datetimeFigureOut">
               <a:rPr lang="en-US" smtClean="0"/>
-              <a:t>10/3/2014</a:t>
+              <a:t>14-10-03</a:t>
             </a:fld>
             <a:endParaRPr lang="en-US"/>
           </a:p>
@@ -1773,7 +1773,7 @@
           <a:p>
             <a:fld id="{4E9D87FA-FB2D-4EA8-9A59-BBCFF0097196}" type="datetimeFigureOut">
               <a:rPr lang="en-US" smtClean="0"/>
-              <a:t>10/3/2014</a:t>
+              <a:t>14-10-03</a:t>
             </a:fld>
             <a:endParaRPr lang="en-US"/>
           </a:p>
@@ -1891,7 +1891,7 @@
           <a:p>
             <a:fld id="{4E9D87FA-FB2D-4EA8-9A59-BBCFF0097196}" type="datetimeFigureOut">
               <a:rPr lang="en-US" smtClean="0"/>
-              <a:t>10/3/2014</a:t>
+              <a:t>14-10-03</a:t>
             </a:fld>
             <a:endParaRPr lang="en-US"/>
           </a:p>
@@ -1986,7 +1986,7 @@
           <a:p>
             <a:fld id="{4E9D87FA-FB2D-4EA8-9A59-BBCFF0097196}" type="datetimeFigureOut">
               <a:rPr lang="en-US" smtClean="0"/>
-              <a:t>10/3/2014</a:t>
+              <a:t>14-10-03</a:t>
             </a:fld>
             <a:endParaRPr lang="en-US"/>
           </a:p>
@@ -2263,7 +2263,7 @@
           <a:p>
             <a:fld id="{4E9D87FA-FB2D-4EA8-9A59-BBCFF0097196}" type="datetimeFigureOut">
               <a:rPr lang="en-US" smtClean="0"/>
-              <a:t>10/3/2014</a:t>
+              <a:t>14-10-03</a:t>
             </a:fld>
             <a:endParaRPr lang="en-US"/>
           </a:p>
@@ -2516,7 +2516,7 @@
           <a:p>
             <a:fld id="{4E9D87FA-FB2D-4EA8-9A59-BBCFF0097196}" type="datetimeFigureOut">
               <a:rPr lang="en-US" smtClean="0"/>
-              <a:t>10/3/2014</a:t>
+              <a:t>14-10-03</a:t>
             </a:fld>
             <a:endParaRPr lang="en-US"/>
           </a:p>
@@ -2729,7 +2729,7 @@
           <a:p>
             <a:fld id="{4E9D87FA-FB2D-4EA8-9A59-BBCFF0097196}" type="datetimeFigureOut">
               <a:rPr lang="en-US" smtClean="0"/>
-              <a:t>10/3/2014</a:t>
+              <a:t>14-10-03</a:t>
             </a:fld>
             <a:endParaRPr lang="en-US"/>
           </a:p>
@@ -3163,7 +3163,7 @@
           </a:prstGeom>
           <a:noFill/>
           <a:extLst>
-            <a:ext uri="{909E8E84-426E-40DD-AFC4-6F175D3DCCD1}">
+            <a:ext uri="{909E8E84-426E-40dd-AFC4-6F175D3DCCD1}">
               <a14:hiddenFill xmlns:a14="http://schemas.microsoft.com/office/drawing/2010/main">
                 <a:solidFill>
                   <a:srgbClr val="FFFFFF"/>
@@ -3499,11 +3499,11 @@
             </a:pPr>
             <a:r>
               <a:rPr lang="en-US" dirty="0" smtClean="0"/>
-              <a:t>Trade, add</a:t>
-            </a:r>
-            <a:r>
-              <a:rPr lang="en-US" smtClean="0"/>
-              <a:t>, emove</a:t>
+              <a:t>Trade, add, </a:t>
+            </a:r>
+            <a:r>
+              <a:rPr lang="en-US" dirty="0" smtClean="0"/>
+              <a:t>remove</a:t>
             </a:r>
             <a:r>
               <a:rPr lang="en-US" dirty="0" smtClean="0"/>

</xml_diff>

<commit_message>
Fixed mention of encryption algorithm
We use SHA-256 encryption now
</commit_message>
<xml_diff>
--- a/Agile Tech.pptx
+++ b/Agile Tech.pptx
@@ -297,7 +297,7 @@
           <a:p>
             <a:fld id="{4E9D87FA-FB2D-4EA8-9A59-BBCFF0097196}" type="datetimeFigureOut">
               <a:rPr lang="en-US" smtClean="0"/>
-              <a:t>14-10-03</a:t>
+              <a:t>10/4/2014</a:t>
             </a:fld>
             <a:endParaRPr lang="en-US"/>
           </a:p>
@@ -467,7 +467,7 @@
           <a:p>
             <a:fld id="{4E9D87FA-FB2D-4EA8-9A59-BBCFF0097196}" type="datetimeFigureOut">
               <a:rPr lang="en-US" smtClean="0"/>
-              <a:t>14-10-03</a:t>
+              <a:t>10/4/2014</a:t>
             </a:fld>
             <a:endParaRPr lang="en-US"/>
           </a:p>
@@ -647,7 +647,7 @@
           <a:p>
             <a:fld id="{4E9D87FA-FB2D-4EA8-9A59-BBCFF0097196}" type="datetimeFigureOut">
               <a:rPr lang="en-US" smtClean="0"/>
-              <a:t>14-10-03</a:t>
+              <a:t>10/4/2014</a:t>
             </a:fld>
             <a:endParaRPr lang="en-US"/>
           </a:p>
@@ -817,7 +817,7 @@
           <a:p>
             <a:fld id="{4E9D87FA-FB2D-4EA8-9A59-BBCFF0097196}" type="datetimeFigureOut">
               <a:rPr lang="en-US" smtClean="0"/>
-              <a:t>14-10-03</a:t>
+              <a:t>10/4/2014</a:t>
             </a:fld>
             <a:endParaRPr lang="en-US"/>
           </a:p>
@@ -1063,7 +1063,7 @@
           <a:p>
             <a:fld id="{4E9D87FA-FB2D-4EA8-9A59-BBCFF0097196}" type="datetimeFigureOut">
               <a:rPr lang="en-US" smtClean="0"/>
-              <a:t>14-10-03</a:t>
+              <a:t>10/4/2014</a:t>
             </a:fld>
             <a:endParaRPr lang="en-US"/>
           </a:p>
@@ -1351,7 +1351,7 @@
           <a:p>
             <a:fld id="{4E9D87FA-FB2D-4EA8-9A59-BBCFF0097196}" type="datetimeFigureOut">
               <a:rPr lang="en-US" smtClean="0"/>
-              <a:t>14-10-03</a:t>
+              <a:t>10/4/2014</a:t>
             </a:fld>
             <a:endParaRPr lang="en-US"/>
           </a:p>
@@ -1773,7 +1773,7 @@
           <a:p>
             <a:fld id="{4E9D87FA-FB2D-4EA8-9A59-BBCFF0097196}" type="datetimeFigureOut">
               <a:rPr lang="en-US" smtClean="0"/>
-              <a:t>14-10-03</a:t>
+              <a:t>10/4/2014</a:t>
             </a:fld>
             <a:endParaRPr lang="en-US"/>
           </a:p>
@@ -1891,7 +1891,7 @@
           <a:p>
             <a:fld id="{4E9D87FA-FB2D-4EA8-9A59-BBCFF0097196}" type="datetimeFigureOut">
               <a:rPr lang="en-US" smtClean="0"/>
-              <a:t>14-10-03</a:t>
+              <a:t>10/4/2014</a:t>
             </a:fld>
             <a:endParaRPr lang="en-US"/>
           </a:p>
@@ -1986,7 +1986,7 @@
           <a:p>
             <a:fld id="{4E9D87FA-FB2D-4EA8-9A59-BBCFF0097196}" type="datetimeFigureOut">
               <a:rPr lang="en-US" smtClean="0"/>
-              <a:t>14-10-03</a:t>
+              <a:t>10/4/2014</a:t>
             </a:fld>
             <a:endParaRPr lang="en-US"/>
           </a:p>
@@ -2263,7 +2263,7 @@
           <a:p>
             <a:fld id="{4E9D87FA-FB2D-4EA8-9A59-BBCFF0097196}" type="datetimeFigureOut">
               <a:rPr lang="en-US" smtClean="0"/>
-              <a:t>14-10-03</a:t>
+              <a:t>10/4/2014</a:t>
             </a:fld>
             <a:endParaRPr lang="en-US"/>
           </a:p>
@@ -2516,7 +2516,7 @@
           <a:p>
             <a:fld id="{4E9D87FA-FB2D-4EA8-9A59-BBCFF0097196}" type="datetimeFigureOut">
               <a:rPr lang="en-US" smtClean="0"/>
-              <a:t>14-10-03</a:t>
+              <a:t>10/4/2014</a:t>
             </a:fld>
             <a:endParaRPr lang="en-US"/>
           </a:p>
@@ -2729,7 +2729,7 @@
           <a:p>
             <a:fld id="{4E9D87FA-FB2D-4EA8-9A59-BBCFF0097196}" type="datetimeFigureOut">
               <a:rPr lang="en-US" smtClean="0"/>
-              <a:t>14-10-03</a:t>
+              <a:t>10/4/2014</a:t>
             </a:fld>
             <a:endParaRPr lang="en-US"/>
           </a:p>
@@ -3163,7 +3163,7 @@
           </a:prstGeom>
           <a:noFill/>
           <a:extLst>
-            <a:ext uri="{909E8E84-426E-40dd-AFC4-6F175D3DCCD1}">
+            <a:ext uri="{909E8E84-426E-40DD-AFC4-6F175D3DCCD1}">
               <a14:hiddenFill xmlns:a14="http://schemas.microsoft.com/office/drawing/2010/main">
                 <a:solidFill>
                   <a:srgbClr val="FFFFFF"/>
@@ -3232,7 +3232,15 @@
             </a:pPr>
             <a:r>
               <a:rPr lang="en-US" dirty="0" smtClean="0"/>
-              <a:t>Our project aim is simplicity so that as little time is spent using the system, while not cutting down of functionality.</a:t>
+              <a:t>Our project aim is simplicity so that as little time is spent using the system, while not cutting down </a:t>
+            </a:r>
+            <a:r>
+              <a:rPr lang="en-US" dirty="0" smtClean="0"/>
+              <a:t>on </a:t>
+            </a:r>
+            <a:r>
+              <a:rPr lang="en-US" dirty="0" smtClean="0"/>
+              <a:t>functionality.</a:t>
             </a:r>
           </a:p>
         </p:txBody>
@@ -3499,15 +3507,7 @@
             </a:pPr>
             <a:r>
               <a:rPr lang="en-US" dirty="0" smtClean="0"/>
-              <a:t>Trade, add, </a:t>
-            </a:r>
-            <a:r>
-              <a:rPr lang="en-US" dirty="0" smtClean="0"/>
-              <a:t>remove</a:t>
-            </a:r>
-            <a:r>
-              <a:rPr lang="en-US" dirty="0" smtClean="0"/>
-              <a:t>, and increase shifts</a:t>
+              <a:t>Trade, add, remove, and increase shifts</a:t>
             </a:r>
           </a:p>
           <a:p>
@@ -3811,7 +3811,15 @@
             </a:pPr>
             <a:r>
               <a:rPr lang="en-US" dirty="0" smtClean="0"/>
-              <a:t>- MD5 Encryption for Passwords</a:t>
+              <a:t>- </a:t>
+            </a:r>
+            <a:r>
+              <a:rPr lang="en-US" dirty="0" smtClean="0"/>
+              <a:t>SHA-256 </a:t>
+            </a:r>
+            <a:r>
+              <a:rPr lang="en-US" dirty="0" smtClean="0"/>
+              <a:t>Encryption for Passwords</a:t>
             </a:r>
             <a:endParaRPr lang="en-US" dirty="0"/>
           </a:p>

</xml_diff>